<commit_message>
add code for emotion analysis
</commit_message>
<xml_diff>
--- a/DataScience/Etc/감정분석_기준.pptx
+++ b/DataScience/Etc/감정분석_기준.pptx
@@ -8,11 +8,6 @@
     <p:sldId id="256" r:id="rId2"/>
     <p:sldId id="257" r:id="rId3"/>
     <p:sldId id="258" r:id="rId4"/>
-    <p:sldId id="260" r:id="rId5"/>
-    <p:sldId id="261" r:id="rId6"/>
-    <p:sldId id="262" r:id="rId7"/>
-    <p:sldId id="263" r:id="rId8"/>
-    <p:sldId id="259" r:id="rId9"/>
   </p:sldIdLst>
   <p:sldSz cx="12192000" cy="6858000"/>
   <p:notesSz cx="6858000" cy="9144000"/>
@@ -111,6 +106,22 @@
       </a:defRPr>
     </a:lvl9pPr>
   </p:defaultTextStyle>
+  <p:extLst>
+    <p:ext uri="{EFAFB233-063F-42B5-8137-9DF3F51BA10A}">
+      <p15:sldGuideLst xmlns:p15="http://schemas.microsoft.com/office/powerpoint/2012/main">
+        <p15:guide id="1" orient="horz" pos="2160">
+          <p15:clr>
+            <a:srgbClr val="A4A3A4"/>
+          </p15:clr>
+        </p15:guide>
+        <p15:guide id="2" pos="3840">
+          <p15:clr>
+            <a:srgbClr val="A4A3A4"/>
+          </p15:clr>
+        </p15:guide>
+      </p15:sldGuideLst>
+    </p:ext>
+  </p:extLst>
 </p:presentation>
 </file>
 
@@ -245,7 +256,7 @@
           <a:p>
             <a:fld id="{94663C4F-4F93-442E-8B44-ED43AC6894A5}" type="datetimeFigureOut">
               <a:rPr lang="ko-KR" altLang="en-US" smtClean="0"/>
-              <a:t>2019-10-08</a:t>
+              <a:t>2019-11-01</a:t>
             </a:fld>
             <a:endParaRPr lang="ko-KR" altLang="en-US"/>
           </a:p>
@@ -415,7 +426,7 @@
           <a:p>
             <a:fld id="{94663C4F-4F93-442E-8B44-ED43AC6894A5}" type="datetimeFigureOut">
               <a:rPr lang="ko-KR" altLang="en-US" smtClean="0"/>
-              <a:t>2019-10-08</a:t>
+              <a:t>2019-11-01</a:t>
             </a:fld>
             <a:endParaRPr lang="ko-KR" altLang="en-US"/>
           </a:p>
@@ -595,7 +606,7 @@
           <a:p>
             <a:fld id="{94663C4F-4F93-442E-8B44-ED43AC6894A5}" type="datetimeFigureOut">
               <a:rPr lang="ko-KR" altLang="en-US" smtClean="0"/>
-              <a:t>2019-10-08</a:t>
+              <a:t>2019-11-01</a:t>
             </a:fld>
             <a:endParaRPr lang="ko-KR" altLang="en-US"/>
           </a:p>
@@ -765,7 +776,7 @@
           <a:p>
             <a:fld id="{94663C4F-4F93-442E-8B44-ED43AC6894A5}" type="datetimeFigureOut">
               <a:rPr lang="ko-KR" altLang="en-US" smtClean="0"/>
-              <a:t>2019-10-08</a:t>
+              <a:t>2019-11-01</a:t>
             </a:fld>
             <a:endParaRPr lang="ko-KR" altLang="en-US"/>
           </a:p>
@@ -1011,7 +1022,7 @@
           <a:p>
             <a:fld id="{94663C4F-4F93-442E-8B44-ED43AC6894A5}" type="datetimeFigureOut">
               <a:rPr lang="ko-KR" altLang="en-US" smtClean="0"/>
-              <a:t>2019-10-08</a:t>
+              <a:t>2019-11-01</a:t>
             </a:fld>
             <a:endParaRPr lang="ko-KR" altLang="en-US"/>
           </a:p>
@@ -1243,7 +1254,7 @@
           <a:p>
             <a:fld id="{94663C4F-4F93-442E-8B44-ED43AC6894A5}" type="datetimeFigureOut">
               <a:rPr lang="ko-KR" altLang="en-US" smtClean="0"/>
-              <a:t>2019-10-08</a:t>
+              <a:t>2019-11-01</a:t>
             </a:fld>
             <a:endParaRPr lang="ko-KR" altLang="en-US"/>
           </a:p>
@@ -1610,7 +1621,7 @@
           <a:p>
             <a:fld id="{94663C4F-4F93-442E-8B44-ED43AC6894A5}" type="datetimeFigureOut">
               <a:rPr lang="ko-KR" altLang="en-US" smtClean="0"/>
-              <a:t>2019-10-08</a:t>
+              <a:t>2019-11-01</a:t>
             </a:fld>
             <a:endParaRPr lang="ko-KR" altLang="en-US"/>
           </a:p>
@@ -1728,7 +1739,7 @@
           <a:p>
             <a:fld id="{94663C4F-4F93-442E-8B44-ED43AC6894A5}" type="datetimeFigureOut">
               <a:rPr lang="ko-KR" altLang="en-US" smtClean="0"/>
-              <a:t>2019-10-08</a:t>
+              <a:t>2019-11-01</a:t>
             </a:fld>
             <a:endParaRPr lang="ko-KR" altLang="en-US"/>
           </a:p>
@@ -1823,7 +1834,7 @@
           <a:p>
             <a:fld id="{94663C4F-4F93-442E-8B44-ED43AC6894A5}" type="datetimeFigureOut">
               <a:rPr lang="ko-KR" altLang="en-US" smtClean="0"/>
-              <a:t>2019-10-08</a:t>
+              <a:t>2019-11-01</a:t>
             </a:fld>
             <a:endParaRPr lang="ko-KR" altLang="en-US"/>
           </a:p>
@@ -2100,7 +2111,7 @@
           <a:p>
             <a:fld id="{94663C4F-4F93-442E-8B44-ED43AC6894A5}" type="datetimeFigureOut">
               <a:rPr lang="ko-KR" altLang="en-US" smtClean="0"/>
-              <a:t>2019-10-08</a:t>
+              <a:t>2019-11-01</a:t>
             </a:fld>
             <a:endParaRPr lang="ko-KR" altLang="en-US"/>
           </a:p>
@@ -2353,7 +2364,7 @@
           <a:p>
             <a:fld id="{94663C4F-4F93-442E-8B44-ED43AC6894A5}" type="datetimeFigureOut">
               <a:rPr lang="ko-KR" altLang="en-US" smtClean="0"/>
-              <a:t>2019-10-08</a:t>
+              <a:t>2019-11-01</a:t>
             </a:fld>
             <a:endParaRPr lang="ko-KR" altLang="en-US"/>
           </a:p>
@@ -2566,7 +2577,7 @@
           <a:p>
             <a:fld id="{94663C4F-4F93-442E-8B44-ED43AC6894A5}" type="datetimeFigureOut">
               <a:rPr lang="ko-KR" altLang="en-US" smtClean="0"/>
-              <a:t>2019-10-08</a:t>
+              <a:t>2019-11-01</a:t>
             </a:fld>
             <a:endParaRPr lang="ko-KR" altLang="en-US"/>
           </a:p>
@@ -2980,7 +2991,7 @@
         <p:spPr>
           <a:xfrm>
             <a:off x="1266092" y="1072662"/>
-            <a:ext cx="9969396" cy="3416320"/>
+            <a:ext cx="9969396" cy="3970318"/>
           </a:xfrm>
           <a:prstGeom prst="rect">
             <a:avLst/>
@@ -3009,7 +3020,7 @@
           <a:p>
             <a:r>
               <a:rPr lang="ko-KR" altLang="en-US" dirty="0" smtClean="0"/>
-              <a:t>슬픔</a:t>
+              <a:t>재미</a:t>
             </a:r>
             <a:r>
               <a:rPr lang="en-US" altLang="ko-KR" dirty="0" smtClean="0"/>
@@ -3017,7 +3028,7 @@
             </a:r>
             <a:r>
               <a:rPr lang="ko-KR" altLang="en-US" dirty="0" smtClean="0"/>
-              <a:t>감동</a:t>
+              <a:t>슬픔</a:t>
             </a:r>
             <a:r>
               <a:rPr lang="en-US" altLang="ko-KR" dirty="0" smtClean="0"/>
@@ -3025,7 +3036,7 @@
             </a:r>
             <a:r>
               <a:rPr lang="ko-KR" altLang="en-US" dirty="0" smtClean="0"/>
-              <a:t>무서움</a:t>
+              <a:t>감동</a:t>
             </a:r>
             <a:r>
               <a:rPr lang="en-US" altLang="ko-KR" dirty="0" smtClean="0"/>
@@ -3033,19 +3044,7 @@
             </a:r>
             <a:r>
               <a:rPr lang="ko-KR" altLang="en-US" dirty="0" smtClean="0"/>
-              <a:t>웃김</a:t>
-            </a:r>
-            <a:r>
-              <a:rPr lang="en-US" altLang="ko-KR" dirty="0" smtClean="0"/>
-              <a:t>,</a:t>
-            </a:r>
-            <a:r>
-              <a:rPr lang="ko-KR" altLang="en-US" dirty="0"/>
-              <a:t> </a:t>
-            </a:r>
-            <a:r>
-              <a:rPr lang="ko-KR" altLang="en-US" dirty="0" smtClean="0"/>
-              <a:t>영상미</a:t>
+              <a:t>무서움</a:t>
             </a:r>
             <a:r>
               <a:rPr lang="en-US" altLang="ko-KR" dirty="0" smtClean="0"/>
@@ -3053,7 +3052,7 @@
             </a:r>
             <a:r>
               <a:rPr lang="ko-KR" altLang="en-US" dirty="0" smtClean="0"/>
-              <a:t>신기함</a:t>
+              <a:t>웃김</a:t>
             </a:r>
             <a:r>
               <a:rPr lang="en-US" altLang="ko-KR" dirty="0" smtClean="0"/>
@@ -3061,7 +3060,11 @@
             </a:r>
             <a:r>
               <a:rPr lang="ko-KR" altLang="en-US" dirty="0" smtClean="0"/>
-              <a:t>반전 </a:t>
+              <a:t>우울</a:t>
+            </a:r>
+            <a:r>
+              <a:rPr lang="en-US" altLang="ko-KR" dirty="0" smtClean="0"/>
+              <a:t>, </a:t>
             </a:r>
             <a:r>
               <a:rPr lang="en-US" altLang="ko-KR" dirty="0" smtClean="0"/>
@@ -3077,7 +3080,45 @@
             </a:r>
             <a:r>
               <a:rPr lang="ko-KR" altLang="en-US" dirty="0" smtClean="0"/>
-              <a:t> 감정들</a:t>
+              <a:t> </a:t>
+            </a:r>
+            <a:r>
+              <a:rPr lang="ko-KR" altLang="en-US" dirty="0" smtClean="0"/>
+              <a:t>감정들</a:t>
+            </a:r>
+            <a:endParaRPr lang="en-US" altLang="ko-KR" dirty="0" smtClean="0"/>
+          </a:p>
+          <a:p>
+            <a:endParaRPr lang="en-US" altLang="ko-KR" dirty="0"/>
+          </a:p>
+          <a:p>
+            <a:r>
+              <a:rPr lang="ko-KR" altLang="en-US" dirty="0"/>
+              <a:t>영상미</a:t>
+            </a:r>
+            <a:r>
+              <a:rPr lang="en-US" altLang="ko-KR" dirty="0"/>
+              <a:t>, </a:t>
+            </a:r>
+            <a:r>
+              <a:rPr lang="ko-KR" altLang="en-US" dirty="0"/>
+              <a:t>신기함</a:t>
+            </a:r>
+            <a:r>
+              <a:rPr lang="en-US" altLang="ko-KR" dirty="0"/>
+              <a:t>, </a:t>
+            </a:r>
+            <a:r>
+              <a:rPr lang="ko-KR" altLang="en-US" dirty="0" smtClean="0"/>
+              <a:t>반전 </a:t>
+            </a:r>
+            <a:r>
+              <a:rPr lang="en-US" altLang="ko-KR" dirty="0" smtClean="0"/>
+              <a:t>– </a:t>
+            </a:r>
+            <a:r>
+              <a:rPr lang="ko-KR" altLang="en-US" dirty="0" smtClean="0"/>
+              <a:t>감정 외 기타</a:t>
             </a:r>
             <a:endParaRPr lang="en-US" altLang="ko-KR" dirty="0" smtClean="0"/>
           </a:p>
@@ -3408,156 +3449,6 @@
     <p:extLst>
       <p:ext uri="{BB962C8B-B14F-4D97-AF65-F5344CB8AC3E}">
         <p14:creationId xmlns:p14="http://schemas.microsoft.com/office/powerpoint/2010/main" val="1021715927"/>
-      </p:ext>
-    </p:extLst>
-  </p:cSld>
-  <p:clrMapOvr>
-    <a:masterClrMapping/>
-  </p:clrMapOvr>
-</p:sld>
-</file>
-
-<file path=ppt/slides/slide4.xml><?xml version="1.0" encoding="utf-8"?>
-<p:sld xmlns:a="http://schemas.openxmlformats.org/drawingml/2006/main" xmlns:r="http://schemas.openxmlformats.org/officeDocument/2006/relationships" xmlns:p="http://schemas.openxmlformats.org/presentationml/2006/main">
-  <p:cSld>
-    <p:spTree>
-      <p:nvGrpSpPr>
-        <p:cNvPr id="1" name=""/>
-        <p:cNvGrpSpPr/>
-        <p:nvPr/>
-      </p:nvGrpSpPr>
-      <p:grpSpPr>
-        <a:xfrm>
-          <a:off x="0" y="0"/>
-          <a:ext cx="0" cy="0"/>
-          <a:chOff x="0" y="0"/>
-          <a:chExt cx="0" cy="0"/>
-        </a:xfrm>
-      </p:grpSpPr>
-    </p:spTree>
-    <p:extLst>
-      <p:ext uri="{BB962C8B-B14F-4D97-AF65-F5344CB8AC3E}">
-        <p14:creationId xmlns:p14="http://schemas.microsoft.com/office/powerpoint/2010/main" val="3017398980"/>
-      </p:ext>
-    </p:extLst>
-  </p:cSld>
-  <p:clrMapOvr>
-    <a:masterClrMapping/>
-  </p:clrMapOvr>
-</p:sld>
-</file>
-
-<file path=ppt/slides/slide5.xml><?xml version="1.0" encoding="utf-8"?>
-<p:sld xmlns:a="http://schemas.openxmlformats.org/drawingml/2006/main" xmlns:r="http://schemas.openxmlformats.org/officeDocument/2006/relationships" xmlns:p="http://schemas.openxmlformats.org/presentationml/2006/main">
-  <p:cSld>
-    <p:spTree>
-      <p:nvGrpSpPr>
-        <p:cNvPr id="1" name=""/>
-        <p:cNvGrpSpPr/>
-        <p:nvPr/>
-      </p:nvGrpSpPr>
-      <p:grpSpPr>
-        <a:xfrm>
-          <a:off x="0" y="0"/>
-          <a:ext cx="0" cy="0"/>
-          <a:chOff x="0" y="0"/>
-          <a:chExt cx="0" cy="0"/>
-        </a:xfrm>
-      </p:grpSpPr>
-    </p:spTree>
-    <p:extLst>
-      <p:ext uri="{BB962C8B-B14F-4D97-AF65-F5344CB8AC3E}">
-        <p14:creationId xmlns:p14="http://schemas.microsoft.com/office/powerpoint/2010/main" val="3017398980"/>
-      </p:ext>
-    </p:extLst>
-  </p:cSld>
-  <p:clrMapOvr>
-    <a:masterClrMapping/>
-  </p:clrMapOvr>
-</p:sld>
-</file>
-
-<file path=ppt/slides/slide6.xml><?xml version="1.0" encoding="utf-8"?>
-<p:sld xmlns:a="http://schemas.openxmlformats.org/drawingml/2006/main" xmlns:r="http://schemas.openxmlformats.org/officeDocument/2006/relationships" xmlns:p="http://schemas.openxmlformats.org/presentationml/2006/main">
-  <p:cSld>
-    <p:spTree>
-      <p:nvGrpSpPr>
-        <p:cNvPr id="1" name=""/>
-        <p:cNvGrpSpPr/>
-        <p:nvPr/>
-      </p:nvGrpSpPr>
-      <p:grpSpPr>
-        <a:xfrm>
-          <a:off x="0" y="0"/>
-          <a:ext cx="0" cy="0"/>
-          <a:chOff x="0" y="0"/>
-          <a:chExt cx="0" cy="0"/>
-        </a:xfrm>
-      </p:grpSpPr>
-    </p:spTree>
-    <p:extLst>
-      <p:ext uri="{BB962C8B-B14F-4D97-AF65-F5344CB8AC3E}">
-        <p14:creationId xmlns:p14="http://schemas.microsoft.com/office/powerpoint/2010/main" val="3017398980"/>
-      </p:ext>
-    </p:extLst>
-  </p:cSld>
-  <p:clrMapOvr>
-    <a:masterClrMapping/>
-  </p:clrMapOvr>
-</p:sld>
-</file>
-
-<file path=ppt/slides/slide7.xml><?xml version="1.0" encoding="utf-8"?>
-<p:sld xmlns:a="http://schemas.openxmlformats.org/drawingml/2006/main" xmlns:r="http://schemas.openxmlformats.org/officeDocument/2006/relationships" xmlns:p="http://schemas.openxmlformats.org/presentationml/2006/main">
-  <p:cSld>
-    <p:spTree>
-      <p:nvGrpSpPr>
-        <p:cNvPr id="1" name=""/>
-        <p:cNvGrpSpPr/>
-        <p:nvPr/>
-      </p:nvGrpSpPr>
-      <p:grpSpPr>
-        <a:xfrm>
-          <a:off x="0" y="0"/>
-          <a:ext cx="0" cy="0"/>
-          <a:chOff x="0" y="0"/>
-          <a:chExt cx="0" cy="0"/>
-        </a:xfrm>
-      </p:grpSpPr>
-    </p:spTree>
-    <p:extLst>
-      <p:ext uri="{BB962C8B-B14F-4D97-AF65-F5344CB8AC3E}">
-        <p14:creationId xmlns:p14="http://schemas.microsoft.com/office/powerpoint/2010/main" val="3017398980"/>
-      </p:ext>
-    </p:extLst>
-  </p:cSld>
-  <p:clrMapOvr>
-    <a:masterClrMapping/>
-  </p:clrMapOvr>
-</p:sld>
-</file>
-
-<file path=ppt/slides/slide8.xml><?xml version="1.0" encoding="utf-8"?>
-<p:sld xmlns:a="http://schemas.openxmlformats.org/drawingml/2006/main" xmlns:r="http://schemas.openxmlformats.org/officeDocument/2006/relationships" xmlns:p="http://schemas.openxmlformats.org/presentationml/2006/main">
-  <p:cSld>
-    <p:spTree>
-      <p:nvGrpSpPr>
-        <p:cNvPr id="1" name=""/>
-        <p:cNvGrpSpPr/>
-        <p:nvPr/>
-      </p:nvGrpSpPr>
-      <p:grpSpPr>
-        <a:xfrm>
-          <a:off x="0" y="0"/>
-          <a:ext cx="0" cy="0"/>
-          <a:chOff x="0" y="0"/>
-          <a:chExt cx="0" cy="0"/>
-        </a:xfrm>
-      </p:grpSpPr>
-    </p:spTree>
-    <p:extLst>
-      <p:ext uri="{BB962C8B-B14F-4D97-AF65-F5344CB8AC3E}">
-        <p14:creationId xmlns:p14="http://schemas.microsoft.com/office/powerpoint/2010/main" val="1162725510"/>
       </p:ext>
     </p:extLst>
   </p:cSld>
@@ -3822,7 +3713,7 @@
   <a:extraClrSchemeLst/>
   <a:extLst>
     <a:ext uri="{05A4C25C-085E-4340-85A3-A5531E510DB2}">
-      <thm15:themeFamily xmlns:thm15="http://schemas.microsoft.com/office/thememl/2012/main" xmlns="" name="Office Theme" id="{62F939B6-93AF-4DB8-9C6B-D6C7DFDC589F}" vid="{4A3C46E8-61CC-4603-A589-7422A47A8E4A}"/>
+      <thm15:themeFamily xmlns:thm15="http://schemas.microsoft.com/office/thememl/2012/main" name="Office Theme" id="{62F939B6-93AF-4DB8-9C6B-D6C7DFDC589F}" vid="{4A3C46E8-61CC-4603-A589-7422A47A8E4A}"/>
     </a:ext>
   </a:extLst>
 </a:theme>

</xml_diff>